<commit_message>
Added Elastic Search Essentials demo
</commit_message>
<xml_diff>
--- a/src/Elastic Search Essentials/Presentation.pptx
+++ b/src/Elastic Search Essentials/Presentation.pptx
@@ -13472,20 +13472,12 @@
           <a:lstStyle/>
           <a:p>
             <a:r>
-              <a:rPr lang="en-US">
-                <a:solidFill>
-                  <a:schemeClr val="tx1"/>
-                </a:solidFill>
-              </a:rPr>
-              <a:t>Elastic Search </a:t>
-            </a:r>
-            <a:r>
               <a:rPr lang="en-US" dirty="0">
                 <a:solidFill>
                   <a:schemeClr val="tx1"/>
                 </a:solidFill>
               </a:rPr>
-              <a:t>Essentials</a:t>
+              <a:t>Elastic Search Essentials</a:t>
             </a:r>
           </a:p>
         </p:txBody>

</xml_diff>